<commit_message>
moving equations into quarto from images
</commit_message>
<xml_diff>
--- a/session1_intro_to_mathematical_modelling/SIRS.pptx
+++ b/session1_intro_to_mathematical_modelling/SIRS.pptx
@@ -3565,7 +3565,7 @@
                     <a:schemeClr val="bg1"/>
                   </a:solidFill>
                 </a:rPr>
-                <a:t>emoved</a:t>
+                <a:t>ecovered</a:t>
               </a:r>
             </a:p>
           </p:txBody>
@@ -4425,526 +4425,324 @@
           <a:chExt cx="0" cy="0"/>
         </a:xfrm>
       </p:grpSpPr>
-      <mc:AlternateContent xmlns:mc="http://schemas.openxmlformats.org/markup-compatibility/2006">
-        <mc:Choice xmlns:a14="http://schemas.microsoft.com/office/drawing/2010/main" Requires="a14">
-          <p:sp>
-            <p:nvSpPr>
-              <p:cNvPr id="4" name="TextBox 3">
-                <a:extLst>
-                  <a:ext uri="{FF2B5EF4-FFF2-40B4-BE49-F238E27FC236}">
-                    <a16:creationId xmlns:a16="http://schemas.microsoft.com/office/drawing/2014/main" id="{F7777DED-A2A2-8EB3-CAAC-3C97AFF077D6}"/>
-                  </a:ext>
-                </a:extLst>
-              </p:cNvPr>
-              <p:cNvSpPr txBox="1"/>
-              <p:nvPr/>
-            </p:nvSpPr>
-            <p:spPr>
-              <a:xfrm>
-                <a:off x="4991720" y="3347349"/>
-                <a:ext cx="2987228" cy="2413738"/>
-              </a:xfrm>
-              <a:prstGeom prst="rect">
-                <a:avLst/>
-              </a:prstGeom>
-              <a:noFill/>
-            </p:spPr>
-            <p:txBody>
-              <a:bodyPr wrap="none" lIns="0" tIns="0" rIns="0" bIns="0" rtlCol="0">
-                <a:spAutoFit/>
-              </a:bodyPr>
-              <a:lstStyle/>
-              <a:p>
-                <a14:m>
-                  <m:oMathPara xmlns:m="http://schemas.openxmlformats.org/officeDocument/2006/math">
-                    <m:oMathParaPr>
-                      <m:jc m:val="centerGroup"/>
-                    </m:oMathParaPr>
-                    <m:oMath xmlns:m="http://schemas.openxmlformats.org/officeDocument/2006/math">
-                      <m:f>
-                        <m:fPr>
-                          <m:ctrlPr>
-                            <a:rPr lang="en-AU" i="1" smtClean="0">
-                              <a:latin typeface="Cambria Math" panose="02040503050406030204" pitchFamily="18" charset="0"/>
-                            </a:rPr>
-                          </m:ctrlPr>
-                        </m:fPr>
-                        <m:num>
-                          <m:r>
-                            <a:rPr lang="en-AU" i="1" smtClean="0">
-                              <a:latin typeface="Cambria Math" panose="02040503050406030204" pitchFamily="18" charset="0"/>
-                            </a:rPr>
-                            <m:t>𝑑</m:t>
-                          </m:r>
-                          <m:r>
-                            <a:rPr lang="en-AU" b="0" i="1" smtClean="0">
-                              <a:latin typeface="Cambria Math" panose="02040503050406030204" pitchFamily="18" charset="0"/>
-                            </a:rPr>
-                            <m:t>𝑆</m:t>
-                          </m:r>
-                          <m:r>
-                            <a:rPr lang="en-AU" b="0" i="1" smtClean="0">
-                              <a:latin typeface="Cambria Math" panose="02040503050406030204" pitchFamily="18" charset="0"/>
-                            </a:rPr>
-                            <m:t>(</m:t>
-                          </m:r>
-                          <m:r>
-                            <a:rPr lang="en-AU" b="0" i="1" smtClean="0">
-                              <a:latin typeface="Cambria Math" panose="02040503050406030204" pitchFamily="18" charset="0"/>
-                            </a:rPr>
-                            <m:t>𝑡</m:t>
-                          </m:r>
-                          <m:r>
-                            <a:rPr lang="en-AU" b="0" i="1" smtClean="0">
-                              <a:latin typeface="Cambria Math" panose="02040503050406030204" pitchFamily="18" charset="0"/>
-                            </a:rPr>
-                            <m:t>)</m:t>
-                          </m:r>
-                        </m:num>
-                        <m:den>
-                          <m:r>
-                            <a:rPr lang="en-AU" i="1" smtClean="0">
-                              <a:latin typeface="Cambria Math" panose="02040503050406030204" pitchFamily="18" charset="0"/>
-                            </a:rPr>
-                            <m:t>𝑑</m:t>
-                          </m:r>
-                          <m:r>
-                            <a:rPr lang="en-AU" b="0" i="1" smtClean="0">
-                              <a:latin typeface="Cambria Math" panose="02040503050406030204" pitchFamily="18" charset="0"/>
-                            </a:rPr>
-                            <m:t>𝑡</m:t>
-                          </m:r>
-                        </m:den>
-                      </m:f>
-                      <m:r>
-                        <a:rPr lang="en-AU" b="0" i="1" smtClean="0">
-                          <a:latin typeface="Cambria Math" panose="02040503050406030204" pitchFamily="18" charset="0"/>
-                        </a:rPr>
-                        <m:t>=−</m:t>
-                      </m:r>
-                      <m:r>
-                        <a:rPr lang="en-AU" b="0" i="1" smtClean="0">
-                          <a:latin typeface="Cambria Math" panose="02040503050406030204" pitchFamily="18" charset="0"/>
-                        </a:rPr>
-                        <m:t>𝜆</m:t>
-                      </m:r>
-                      <m:d>
-                        <m:dPr>
-                          <m:ctrlPr>
-                            <a:rPr lang="en-AU" b="0" i="1" smtClean="0">
-                              <a:latin typeface="Cambria Math" panose="02040503050406030204" pitchFamily="18" charset="0"/>
-                            </a:rPr>
-                          </m:ctrlPr>
-                        </m:dPr>
-                        <m:e>
-                          <m:r>
-                            <a:rPr lang="en-AU" b="0" i="1" smtClean="0">
-                              <a:latin typeface="Cambria Math" panose="02040503050406030204" pitchFamily="18" charset="0"/>
-                            </a:rPr>
-                            <m:t>𝑡</m:t>
-                          </m:r>
-                        </m:e>
-                      </m:d>
-                      <m:r>
-                        <a:rPr lang="en-AU" b="0" i="1" smtClean="0">
-                          <a:latin typeface="Cambria Math" panose="02040503050406030204" pitchFamily="18" charset="0"/>
-                        </a:rPr>
-                        <m:t>𝑆</m:t>
-                      </m:r>
-                      <m:d>
-                        <m:dPr>
-                          <m:ctrlPr>
-                            <a:rPr lang="en-AU" b="0" i="1" smtClean="0">
-                              <a:latin typeface="Cambria Math" panose="02040503050406030204" pitchFamily="18" charset="0"/>
-                            </a:rPr>
-                          </m:ctrlPr>
-                        </m:dPr>
-                        <m:e>
-                          <m:r>
-                            <a:rPr lang="en-AU" b="0" i="1" smtClean="0">
-                              <a:latin typeface="Cambria Math" panose="02040503050406030204" pitchFamily="18" charset="0"/>
-                            </a:rPr>
-                            <m:t>𝑡</m:t>
-                          </m:r>
-                        </m:e>
-                      </m:d>
-                      <m:r>
-                        <a:rPr lang="en-AU" b="0" i="1" smtClean="0">
-                          <a:latin typeface="Cambria Math" panose="02040503050406030204" pitchFamily="18" charset="0"/>
-                        </a:rPr>
-                        <m:t>+</m:t>
-                      </m:r>
-                      <m:r>
-                        <a:rPr lang="en-AU" b="0" i="1" smtClean="0">
-                          <a:latin typeface="Cambria Math" panose="02040503050406030204" pitchFamily="18" charset="0"/>
-                        </a:rPr>
-                        <m:t>𝜔</m:t>
-                      </m:r>
-                      <m:r>
-                        <a:rPr lang="en-AU" b="0" i="1" smtClean="0">
-                          <a:latin typeface="Cambria Math" panose="02040503050406030204" pitchFamily="18" charset="0"/>
-                        </a:rPr>
-                        <m:t>𝑅</m:t>
-                      </m:r>
-                      <m:d>
-                        <m:dPr>
-                          <m:ctrlPr>
-                            <a:rPr lang="en-AU" b="0" i="1" smtClean="0">
-                              <a:latin typeface="Cambria Math" panose="02040503050406030204" pitchFamily="18" charset="0"/>
-                            </a:rPr>
-                          </m:ctrlPr>
-                        </m:dPr>
-                        <m:e>
-                          <m:r>
-                            <a:rPr lang="en-AU" b="0" i="1" smtClean="0">
-                              <a:latin typeface="Cambria Math" panose="02040503050406030204" pitchFamily="18" charset="0"/>
-                            </a:rPr>
-                            <m:t>𝑡</m:t>
-                          </m:r>
-                        </m:e>
-                      </m:d>
-                    </m:oMath>
-                  </m:oMathPara>
-                </a14:m>
-                <a:endParaRPr lang="en-AU" b="0" dirty="0"/>
-              </a:p>
-              <a:p>
-                <a:endParaRPr lang="en-AU" dirty="0"/>
-              </a:p>
-              <a:p>
-                <a14:m>
-                  <m:oMathPara xmlns:m="http://schemas.openxmlformats.org/officeDocument/2006/math">
-                    <m:oMathParaPr>
-                      <m:jc m:val="centerGroup"/>
-                    </m:oMathParaPr>
-                    <m:oMath xmlns:m="http://schemas.openxmlformats.org/officeDocument/2006/math">
-                      <m:f>
-                        <m:fPr>
-                          <m:ctrlPr>
-                            <a:rPr lang="en-AU" i="1" smtClean="0">
-                              <a:latin typeface="Cambria Math" panose="02040503050406030204" pitchFamily="18" charset="0"/>
-                            </a:rPr>
-                          </m:ctrlPr>
-                        </m:fPr>
-                        <m:num>
-                          <m:r>
-                            <a:rPr lang="en-AU" i="1" smtClean="0">
-                              <a:latin typeface="Cambria Math" panose="02040503050406030204" pitchFamily="18" charset="0"/>
-                            </a:rPr>
-                            <m:t>𝑑</m:t>
-                          </m:r>
-                          <m:r>
-                            <a:rPr lang="en-AU" b="0" i="1" smtClean="0">
-                              <a:latin typeface="Cambria Math" panose="02040503050406030204" pitchFamily="18" charset="0"/>
-                            </a:rPr>
-                            <m:t>𝐼</m:t>
-                          </m:r>
-                          <m:r>
-                            <a:rPr lang="en-AU" b="0" i="1" smtClean="0">
-                              <a:latin typeface="Cambria Math" panose="02040503050406030204" pitchFamily="18" charset="0"/>
-                            </a:rPr>
-                            <m:t>(</m:t>
-                          </m:r>
-                          <m:r>
-                            <a:rPr lang="en-AU" b="0" i="1" smtClean="0">
-                              <a:latin typeface="Cambria Math" panose="02040503050406030204" pitchFamily="18" charset="0"/>
-                            </a:rPr>
-                            <m:t>𝑡</m:t>
-                          </m:r>
-                          <m:r>
-                            <a:rPr lang="en-AU" b="0" i="1" smtClean="0">
-                              <a:latin typeface="Cambria Math" panose="02040503050406030204" pitchFamily="18" charset="0"/>
-                            </a:rPr>
-                            <m:t>)</m:t>
-                          </m:r>
-                        </m:num>
-                        <m:den>
-                          <m:r>
-                            <a:rPr lang="en-AU" i="1" smtClean="0">
-                              <a:latin typeface="Cambria Math" panose="02040503050406030204" pitchFamily="18" charset="0"/>
-                            </a:rPr>
-                            <m:t>𝑑</m:t>
-                          </m:r>
-                          <m:r>
-                            <a:rPr lang="en-AU" b="0" i="1" smtClean="0">
-                              <a:latin typeface="Cambria Math" panose="02040503050406030204" pitchFamily="18" charset="0"/>
-                            </a:rPr>
-                            <m:t>𝑡</m:t>
-                          </m:r>
-                        </m:den>
-                      </m:f>
-                      <m:r>
-                        <a:rPr lang="en-AU" b="0" i="1" smtClean="0">
-                          <a:latin typeface="Cambria Math" panose="02040503050406030204" pitchFamily="18" charset="0"/>
-                        </a:rPr>
-                        <m:t>=+</m:t>
-                      </m:r>
-                      <m:r>
-                        <a:rPr lang="en-AU" b="0" i="1" smtClean="0">
-                          <a:latin typeface="Cambria Math" panose="02040503050406030204" pitchFamily="18" charset="0"/>
-                        </a:rPr>
-                        <m:t>𝜆</m:t>
-                      </m:r>
-                      <m:d>
-                        <m:dPr>
-                          <m:ctrlPr>
-                            <a:rPr lang="en-AU" b="0" i="1" smtClean="0">
-                              <a:latin typeface="Cambria Math" panose="02040503050406030204" pitchFamily="18" charset="0"/>
-                            </a:rPr>
-                          </m:ctrlPr>
-                        </m:dPr>
-                        <m:e>
-                          <m:r>
-                            <a:rPr lang="en-AU" b="0" i="1" smtClean="0">
-                              <a:latin typeface="Cambria Math" panose="02040503050406030204" pitchFamily="18" charset="0"/>
-                            </a:rPr>
-                            <m:t>𝑡</m:t>
-                          </m:r>
-                        </m:e>
-                      </m:d>
-                      <m:r>
-                        <a:rPr lang="en-AU" b="0" i="1" smtClean="0">
-                          <a:latin typeface="Cambria Math" panose="02040503050406030204" pitchFamily="18" charset="0"/>
-                        </a:rPr>
-                        <m:t>𝑆</m:t>
-                      </m:r>
-                      <m:d>
-                        <m:dPr>
-                          <m:ctrlPr>
-                            <a:rPr lang="en-AU" b="0" i="1" smtClean="0">
-                              <a:latin typeface="Cambria Math" panose="02040503050406030204" pitchFamily="18" charset="0"/>
-                            </a:rPr>
-                          </m:ctrlPr>
-                        </m:dPr>
-                        <m:e>
-                          <m:r>
-                            <a:rPr lang="en-AU" b="0" i="1" smtClean="0">
-                              <a:latin typeface="Cambria Math" panose="02040503050406030204" pitchFamily="18" charset="0"/>
-                            </a:rPr>
-                            <m:t>𝑡</m:t>
-                          </m:r>
-                        </m:e>
-                      </m:d>
-                      <m:r>
-                        <a:rPr lang="en-AU" b="0" i="1" smtClean="0">
-                          <a:latin typeface="Cambria Math" panose="02040503050406030204" pitchFamily="18" charset="0"/>
-                        </a:rPr>
-                        <m:t>−</m:t>
-                      </m:r>
-                      <m:r>
-                        <a:rPr lang="en-AU" b="0" i="1" smtClean="0">
-                          <a:latin typeface="Cambria Math" panose="02040503050406030204" pitchFamily="18" charset="0"/>
-                        </a:rPr>
-                        <m:t>𝛾</m:t>
-                      </m:r>
-                      <m:r>
-                        <a:rPr lang="en-AU" b="0" i="1" smtClean="0">
-                          <a:latin typeface="Cambria Math" panose="02040503050406030204" pitchFamily="18" charset="0"/>
-                        </a:rPr>
-                        <m:t>𝐼</m:t>
-                      </m:r>
-                      <m:d>
-                        <m:dPr>
-                          <m:ctrlPr>
-                            <a:rPr lang="en-AU" b="0" i="1" smtClean="0">
-                              <a:latin typeface="Cambria Math" panose="02040503050406030204" pitchFamily="18" charset="0"/>
-                            </a:rPr>
-                          </m:ctrlPr>
-                        </m:dPr>
-                        <m:e>
-                          <m:r>
-                            <a:rPr lang="en-AU" b="0" i="1" smtClean="0">
-                              <a:latin typeface="Cambria Math" panose="02040503050406030204" pitchFamily="18" charset="0"/>
-                            </a:rPr>
-                            <m:t>𝑡</m:t>
-                          </m:r>
-                        </m:e>
-                      </m:d>
-                    </m:oMath>
-                  </m:oMathPara>
-                </a14:m>
-                <a:endParaRPr lang="en-AU" b="0" dirty="0"/>
-              </a:p>
-              <a:p>
-                <a:endParaRPr lang="en-AU" dirty="0"/>
-              </a:p>
-              <a:p>
-                <a14:m>
-                  <m:oMathPara xmlns:m="http://schemas.openxmlformats.org/officeDocument/2006/math">
-                    <m:oMathParaPr>
-                      <m:jc m:val="centerGroup"/>
-                    </m:oMathParaPr>
-                    <m:oMath xmlns:m="http://schemas.openxmlformats.org/officeDocument/2006/math">
-                      <m:f>
-                        <m:fPr>
-                          <m:ctrlPr>
-                            <a:rPr lang="en-AU" b="0" i="1" smtClean="0">
-                              <a:latin typeface="Cambria Math" panose="02040503050406030204" pitchFamily="18" charset="0"/>
-                            </a:rPr>
-                          </m:ctrlPr>
-                        </m:fPr>
-                        <m:num>
-                          <m:r>
-                            <a:rPr lang="en-AU" b="0" i="1" smtClean="0">
-                              <a:latin typeface="Cambria Math" panose="02040503050406030204" pitchFamily="18" charset="0"/>
-                            </a:rPr>
-                            <m:t>𝑑𝑅</m:t>
-                          </m:r>
-                          <m:r>
-                            <a:rPr lang="en-AU" b="0" i="1" smtClean="0">
-                              <a:latin typeface="Cambria Math" panose="02040503050406030204" pitchFamily="18" charset="0"/>
-                            </a:rPr>
-                            <m:t>(</m:t>
-                          </m:r>
-                          <m:r>
-                            <a:rPr lang="en-AU" b="0" i="1" smtClean="0">
-                              <a:latin typeface="Cambria Math" panose="02040503050406030204" pitchFamily="18" charset="0"/>
-                            </a:rPr>
-                            <m:t>𝑡</m:t>
-                          </m:r>
-                          <m:r>
-                            <a:rPr lang="en-AU" b="0" i="1" smtClean="0">
-                              <a:latin typeface="Cambria Math" panose="02040503050406030204" pitchFamily="18" charset="0"/>
-                            </a:rPr>
-                            <m:t>)</m:t>
-                          </m:r>
-                        </m:num>
-                        <m:den>
-                          <m:r>
-                            <a:rPr lang="en-AU" b="0" i="1" smtClean="0">
-                              <a:latin typeface="Cambria Math" panose="02040503050406030204" pitchFamily="18" charset="0"/>
-                            </a:rPr>
-                            <m:t>𝑑𝑡</m:t>
-                          </m:r>
-                        </m:den>
-                      </m:f>
-                      <m:r>
-                        <a:rPr lang="en-AU" b="0" i="1" smtClean="0">
-                          <a:latin typeface="Cambria Math" panose="02040503050406030204" pitchFamily="18" charset="0"/>
-                        </a:rPr>
-                        <m:t>=+</m:t>
-                      </m:r>
-                      <m:r>
-                        <a:rPr lang="en-AU" b="0" i="1" smtClean="0">
-                          <a:latin typeface="Cambria Math" panose="02040503050406030204" pitchFamily="18" charset="0"/>
-                        </a:rPr>
-                        <m:t>𝛾</m:t>
-                      </m:r>
-                      <m:r>
-                        <a:rPr lang="en-AU" b="0" i="1" smtClean="0">
-                          <a:latin typeface="Cambria Math" panose="02040503050406030204" pitchFamily="18" charset="0"/>
-                        </a:rPr>
-                        <m:t>𝐼</m:t>
-                      </m:r>
-                      <m:d>
-                        <m:dPr>
-                          <m:ctrlPr>
-                            <a:rPr lang="en-AU" b="0" i="1" smtClean="0">
-                              <a:latin typeface="Cambria Math" panose="02040503050406030204" pitchFamily="18" charset="0"/>
-                            </a:rPr>
-                          </m:ctrlPr>
-                        </m:dPr>
-                        <m:e>
-                          <m:r>
-                            <a:rPr lang="en-AU" b="0" i="1" smtClean="0">
-                              <a:latin typeface="Cambria Math" panose="02040503050406030204" pitchFamily="18" charset="0"/>
-                            </a:rPr>
-                            <m:t>𝑡</m:t>
-                          </m:r>
-                        </m:e>
-                      </m:d>
-                      <m:r>
-                        <a:rPr lang="en-AU" b="0" i="1" smtClean="0">
-                          <a:latin typeface="Cambria Math" panose="02040503050406030204" pitchFamily="18" charset="0"/>
-                        </a:rPr>
-                        <m:t>−</m:t>
-                      </m:r>
-                      <m:r>
-                        <a:rPr lang="en-AU" b="0" i="1" smtClean="0">
-                          <a:latin typeface="Cambria Math" panose="02040503050406030204" pitchFamily="18" charset="0"/>
-                        </a:rPr>
-                        <m:t>𝜔</m:t>
-                      </m:r>
-                      <m:r>
-                        <a:rPr lang="en-AU" b="0" i="1" smtClean="0">
-                          <a:latin typeface="Cambria Math" panose="02040503050406030204" pitchFamily="18" charset="0"/>
-                        </a:rPr>
-                        <m:t>𝑅</m:t>
-                      </m:r>
-                      <m:r>
-                        <a:rPr lang="en-AU" b="0" i="1" smtClean="0">
-                          <a:latin typeface="Cambria Math" panose="02040503050406030204" pitchFamily="18" charset="0"/>
-                        </a:rPr>
-                        <m:t>(</m:t>
-                      </m:r>
-                      <m:r>
-                        <a:rPr lang="en-AU" b="0" i="1" smtClean="0">
-                          <a:latin typeface="Cambria Math" panose="02040503050406030204" pitchFamily="18" charset="0"/>
-                        </a:rPr>
-                        <m:t>𝑡</m:t>
-                      </m:r>
-                      <m:r>
-                        <a:rPr lang="en-AU" b="0" i="1" smtClean="0">
-                          <a:latin typeface="Cambria Math" panose="02040503050406030204" pitchFamily="18" charset="0"/>
-                        </a:rPr>
-                        <m:t>)</m:t>
-                      </m:r>
-                    </m:oMath>
-                  </m:oMathPara>
-                </a14:m>
-                <a:endParaRPr lang="en-AU" b="0" dirty="0"/>
-              </a:p>
-              <a:p>
-                <a:endParaRPr lang="en-AU" dirty="0"/>
-              </a:p>
-            </p:txBody>
-          </p:sp>
-        </mc:Choice>
-        <mc:Fallback>
-          <p:sp>
-            <p:nvSpPr>
-              <p:cNvPr id="4" name="TextBox 3">
-                <a:extLst>
-                  <a:ext uri="{FF2B5EF4-FFF2-40B4-BE49-F238E27FC236}">
-                    <a16:creationId xmlns:a16="http://schemas.microsoft.com/office/drawing/2014/main" id="{F7777DED-A2A2-8EB3-CAAC-3C97AFF077D6}"/>
-                  </a:ext>
-                </a:extLst>
-              </p:cNvPr>
-              <p:cNvSpPr txBox="1">
-                <a:spLocks noRot="1" noChangeAspect="1" noMove="1" noResize="1" noEditPoints="1" noAdjustHandles="1" noChangeArrowheads="1" noChangeShapeType="1" noTextEdit="1"/>
-              </p:cNvSpPr>
-              <p:nvPr/>
-            </p:nvSpPr>
-            <p:spPr>
-              <a:xfrm>
-                <a:off x="4991720" y="3347349"/>
-                <a:ext cx="2987228" cy="2413738"/>
-              </a:xfrm>
-              <a:prstGeom prst="rect">
-                <a:avLst/>
-              </a:prstGeom>
-              <a:blipFill>
-                <a:blip r:embed="rId2"/>
-                <a:stretch>
-                  <a:fillRect t="-1047"/>
-                </a:stretch>
-              </a:blipFill>
-            </p:spPr>
-            <p:txBody>
-              <a:bodyPr/>
-              <a:lstStyle/>
-              <a:p>
-                <a:r>
-                  <a:rPr lang="en-AU">
-                    <a:noFill/>
-                  </a:rPr>
-                  <a:t> </a:t>
-                </a:r>
-              </a:p>
-            </p:txBody>
-          </p:sp>
-        </mc:Fallback>
-      </mc:AlternateContent>
+      <p:grpSp>
+        <p:nvGrpSpPr>
+          <p:cNvPr id="18" name="Group 17">
+            <a:extLst>
+              <a:ext uri="{FF2B5EF4-FFF2-40B4-BE49-F238E27FC236}">
+                <a16:creationId xmlns:a16="http://schemas.microsoft.com/office/drawing/2014/main" id="{BA05BC47-3EFE-2D90-D060-9DE6CAD4AFA5}"/>
+              </a:ext>
+            </a:extLst>
+          </p:cNvPr>
+          <p:cNvGrpSpPr/>
+          <p:nvPr/>
+        </p:nvGrpSpPr>
+        <p:grpSpPr>
+          <a:xfrm>
+            <a:off x="2739420" y="2417742"/>
+            <a:ext cx="6945146" cy="612648"/>
+            <a:chOff x="2739420" y="2417742"/>
+            <a:chExt cx="6945146" cy="612648"/>
+          </a:xfrm>
+        </p:grpSpPr>
+        <p:sp>
+          <p:nvSpPr>
+            <p:cNvPr id="6" name="Process 5">
+              <a:extLst>
+                <a:ext uri="{FF2B5EF4-FFF2-40B4-BE49-F238E27FC236}">
+                  <a16:creationId xmlns:a16="http://schemas.microsoft.com/office/drawing/2014/main" id="{2D3110D5-47B9-0831-F19E-65579AD7C4DA}"/>
+                </a:ext>
+              </a:extLst>
+            </p:cNvPr>
+            <p:cNvSpPr/>
+            <p:nvPr/>
+          </p:nvSpPr>
+          <p:spPr>
+            <a:xfrm>
+              <a:off x="2739420" y="2417742"/>
+              <a:ext cx="1368152" cy="612648"/>
+            </a:xfrm>
+            <a:prstGeom prst="flowChartProcess">
+              <a:avLst/>
+            </a:prstGeom>
+            <a:solidFill>
+              <a:srgbClr val="5B9CD5"/>
+            </a:solidFill>
+            <a:ln>
+              <a:solidFill>
+                <a:srgbClr val="5B9CD5"/>
+              </a:solidFill>
+            </a:ln>
+          </p:spPr>
+          <p:style>
+            <a:lnRef idx="2">
+              <a:schemeClr val="accent2">
+                <a:shade val="50000"/>
+              </a:schemeClr>
+            </a:lnRef>
+            <a:fillRef idx="1">
+              <a:schemeClr val="accent2"/>
+            </a:fillRef>
+            <a:effectRef idx="0">
+              <a:schemeClr val="accent2"/>
+            </a:effectRef>
+            <a:fontRef idx="minor">
+              <a:schemeClr val="lt1"/>
+            </a:fontRef>
+          </p:style>
+          <p:txBody>
+            <a:bodyPr rtlCol="0" anchor="ctr"/>
+            <a:lstStyle/>
+            <a:p>
+              <a:pPr algn="ctr"/>
+              <a:r>
+                <a:rPr lang="en-AU" sz="2800" b="1" dirty="0">
+                  <a:solidFill>
+                    <a:schemeClr val="bg1"/>
+                  </a:solidFill>
+                </a:rPr>
+                <a:t>S</a:t>
+              </a:r>
+              <a:r>
+                <a:rPr lang="en-AU" dirty="0">
+                  <a:solidFill>
+                    <a:schemeClr val="bg1"/>
+                  </a:solidFill>
+                </a:rPr>
+                <a:t>usceptible</a:t>
+              </a:r>
+            </a:p>
+          </p:txBody>
+        </p:sp>
+        <p:sp>
+          <p:nvSpPr>
+            <p:cNvPr id="7" name="Process 6">
+              <a:extLst>
+                <a:ext uri="{FF2B5EF4-FFF2-40B4-BE49-F238E27FC236}">
+                  <a16:creationId xmlns:a16="http://schemas.microsoft.com/office/drawing/2014/main" id="{1684E2B6-818A-CC51-329A-7E4B351AC5E9}"/>
+                </a:ext>
+              </a:extLst>
+            </p:cNvPr>
+            <p:cNvSpPr/>
+            <p:nvPr/>
+          </p:nvSpPr>
+          <p:spPr>
+            <a:xfrm>
+              <a:off x="5580110" y="2417742"/>
+              <a:ext cx="1368152" cy="612648"/>
+            </a:xfrm>
+            <a:prstGeom prst="flowChartProcess">
+              <a:avLst/>
+            </a:prstGeom>
+            <a:solidFill>
+              <a:srgbClr val="5B9CD5"/>
+            </a:solidFill>
+            <a:ln>
+              <a:solidFill>
+                <a:srgbClr val="5B9CD5"/>
+              </a:solidFill>
+            </a:ln>
+          </p:spPr>
+          <p:style>
+            <a:lnRef idx="2">
+              <a:schemeClr val="accent6">
+                <a:shade val="50000"/>
+              </a:schemeClr>
+            </a:lnRef>
+            <a:fillRef idx="1">
+              <a:schemeClr val="accent6"/>
+            </a:fillRef>
+            <a:effectRef idx="0">
+              <a:schemeClr val="accent6"/>
+            </a:effectRef>
+            <a:fontRef idx="minor">
+              <a:schemeClr val="lt1"/>
+            </a:fontRef>
+          </p:style>
+          <p:txBody>
+            <a:bodyPr rtlCol="0" anchor="ctr"/>
+            <a:lstStyle/>
+            <a:p>
+              <a:pPr algn="ctr"/>
+              <a:r>
+                <a:rPr lang="en-AU" sz="2800" b="1" dirty="0">
+                  <a:solidFill>
+                    <a:schemeClr val="bg1"/>
+                  </a:solidFill>
+                </a:rPr>
+                <a:t>I</a:t>
+              </a:r>
+              <a:r>
+                <a:rPr lang="en-AU" dirty="0">
+                  <a:solidFill>
+                    <a:schemeClr val="bg1"/>
+                  </a:solidFill>
+                </a:rPr>
+                <a:t>nfectious</a:t>
+              </a:r>
+            </a:p>
+          </p:txBody>
+        </p:sp>
+        <p:sp>
+          <p:nvSpPr>
+            <p:cNvPr id="8" name="Process 7">
+              <a:extLst>
+                <a:ext uri="{FF2B5EF4-FFF2-40B4-BE49-F238E27FC236}">
+                  <a16:creationId xmlns:a16="http://schemas.microsoft.com/office/drawing/2014/main" id="{700A673F-CCA9-D9E7-F026-A8FC6AB1185C}"/>
+                </a:ext>
+              </a:extLst>
+            </p:cNvPr>
+            <p:cNvSpPr/>
+            <p:nvPr/>
+          </p:nvSpPr>
+          <p:spPr>
+            <a:xfrm>
+              <a:off x="8316414" y="2417742"/>
+              <a:ext cx="1368152" cy="612648"/>
+            </a:xfrm>
+            <a:prstGeom prst="flowChartProcess">
+              <a:avLst/>
+            </a:prstGeom>
+            <a:solidFill>
+              <a:srgbClr val="5B9CD5"/>
+            </a:solidFill>
+            <a:ln>
+              <a:solidFill>
+                <a:srgbClr val="5B9CD5"/>
+              </a:solidFill>
+            </a:ln>
+          </p:spPr>
+          <p:style>
+            <a:lnRef idx="2">
+              <a:schemeClr val="accent5">
+                <a:shade val="50000"/>
+              </a:schemeClr>
+            </a:lnRef>
+            <a:fillRef idx="1">
+              <a:schemeClr val="accent5"/>
+            </a:fillRef>
+            <a:effectRef idx="0">
+              <a:schemeClr val="accent5"/>
+            </a:effectRef>
+            <a:fontRef idx="minor">
+              <a:schemeClr val="lt1"/>
+            </a:fontRef>
+          </p:style>
+          <p:txBody>
+            <a:bodyPr rtlCol="0" anchor="ctr"/>
+            <a:lstStyle/>
+            <a:p>
+              <a:pPr algn="ctr"/>
+              <a:r>
+                <a:rPr lang="en-AU" sz="2800" b="1" dirty="0">
+                  <a:solidFill>
+                    <a:schemeClr val="bg1"/>
+                  </a:solidFill>
+                </a:rPr>
+                <a:t>R</a:t>
+              </a:r>
+              <a:r>
+                <a:rPr lang="en-AU" dirty="0">
+                  <a:solidFill>
+                    <a:schemeClr val="bg1"/>
+                  </a:solidFill>
+                </a:rPr>
+                <a:t>ecovered</a:t>
+              </a:r>
+            </a:p>
+          </p:txBody>
+        </p:sp>
+        <p:cxnSp>
+          <p:nvCxnSpPr>
+            <p:cNvPr id="9" name="Straight Arrow Connector 8">
+              <a:extLst>
+                <a:ext uri="{FF2B5EF4-FFF2-40B4-BE49-F238E27FC236}">
+                  <a16:creationId xmlns:a16="http://schemas.microsoft.com/office/drawing/2014/main" id="{D8FA2B3E-B670-C200-908A-3E436C0F3245}"/>
+                </a:ext>
+              </a:extLst>
+            </p:cNvPr>
+            <p:cNvCxnSpPr>
+              <a:stCxn id="6" idx="3"/>
+              <a:endCxn id="7" idx="1"/>
+            </p:cNvCxnSpPr>
+            <p:nvPr/>
+          </p:nvCxnSpPr>
+          <p:spPr>
+            <a:xfrm>
+              <a:off x="4107572" y="2724066"/>
+              <a:ext cx="1472538" cy="0"/>
+            </a:xfrm>
+            <a:prstGeom prst="straightConnector1">
+              <a:avLst/>
+            </a:prstGeom>
+            <a:ln w="25400">
+              <a:solidFill>
+                <a:srgbClr val="FF0000"/>
+              </a:solidFill>
+              <a:tailEnd type="triangle"/>
+            </a:ln>
+          </p:spPr>
+          <p:style>
+            <a:lnRef idx="1">
+              <a:schemeClr val="accent1"/>
+            </a:lnRef>
+            <a:fillRef idx="0">
+              <a:schemeClr val="accent1"/>
+            </a:fillRef>
+            <a:effectRef idx="0">
+              <a:schemeClr val="accent1"/>
+            </a:effectRef>
+            <a:fontRef idx="minor">
+              <a:schemeClr val="tx1"/>
+            </a:fontRef>
+          </p:style>
+        </p:cxnSp>
+        <p:cxnSp>
+          <p:nvCxnSpPr>
+            <p:cNvPr id="10" name="Straight Arrow Connector 9">
+              <a:extLst>
+                <a:ext uri="{FF2B5EF4-FFF2-40B4-BE49-F238E27FC236}">
+                  <a16:creationId xmlns:a16="http://schemas.microsoft.com/office/drawing/2014/main" id="{3D72E1DE-EDA8-7554-C888-8DD278484902}"/>
+                </a:ext>
+              </a:extLst>
+            </p:cNvPr>
+            <p:cNvCxnSpPr>
+              <a:cxnSpLocks/>
+              <a:endCxn id="8" idx="1"/>
+            </p:cNvCxnSpPr>
+            <p:nvPr/>
+          </p:nvCxnSpPr>
+          <p:spPr>
+            <a:xfrm>
+              <a:off x="6948262" y="2724066"/>
+              <a:ext cx="1368152" cy="0"/>
+            </a:xfrm>
+            <a:prstGeom prst="straightConnector1">
+              <a:avLst/>
+            </a:prstGeom>
+            <a:ln w="25400">
+              <a:solidFill>
+                <a:srgbClr val="FF0000"/>
+              </a:solidFill>
+              <a:tailEnd type="triangle"/>
+            </a:ln>
+          </p:spPr>
+          <p:style>
+            <a:lnRef idx="1">
+              <a:schemeClr val="accent1"/>
+            </a:lnRef>
+            <a:fillRef idx="0">
+              <a:schemeClr val="accent1"/>
+            </a:fillRef>
+            <a:effectRef idx="0">
+              <a:schemeClr val="accent1"/>
+            </a:effectRef>
+            <a:fontRef idx="minor">
+              <a:schemeClr val="tx1"/>
+            </a:fontRef>
+          </p:style>
+        </p:cxnSp>
+      </p:grpSp>
     </p:spTree>
     <p:extLst>
       <p:ext uri="{BB962C8B-B14F-4D97-AF65-F5344CB8AC3E}">

</xml_diff>

<commit_message>
making notation consistency changes
</commit_message>
<xml_diff>
--- a/session1_intro_to_mathematical_modelling/SIRS.pptx
+++ b/session1_intro_to_mathematical_modelling/SIRS.pptx
@@ -6,7 +6,8 @@
   </p:sldMasterIdLst>
   <p:sldIdLst>
     <p:sldId id="256" r:id="rId2"/>
-    <p:sldId id="257" r:id="rId3"/>
+    <p:sldId id="258" r:id="rId3"/>
+    <p:sldId id="257" r:id="rId4"/>
   </p:sldIdLst>
   <p:sldSz cx="12192000" cy="6858000"/>
   <p:notesSz cx="6858000" cy="9144000"/>
@@ -105,6 +106,11 @@
       </a:defRPr>
     </a:lvl9pPr>
   </p:defaultTextStyle>
+  <p:extLst>
+    <p:ext uri="{EFAFB233-063F-42B5-8137-9DF3F51BA10A}">
+      <p15:sldGuideLst xmlns:p15="http://schemas.microsoft.com/office/powerpoint/2012/main"/>
+    </p:ext>
+  </p:extLst>
 </p:presentation>
 </file>
 
@@ -257,7 +263,7 @@
           <a:p>
             <a:fld id="{563D15DA-2CD3-5845-931C-11EBD52AFC9B}" type="datetimeFigureOut">
               <a:rPr lang="en-AU" smtClean="0"/>
-              <a:t>5/6/2023</a:t>
+              <a:t>6/6/2023</a:t>
             </a:fld>
             <a:endParaRPr lang="en-AU"/>
           </a:p>
@@ -457,7 +463,7 @@
           <a:p>
             <a:fld id="{563D15DA-2CD3-5845-931C-11EBD52AFC9B}" type="datetimeFigureOut">
               <a:rPr lang="en-AU" smtClean="0"/>
-              <a:t>5/6/2023</a:t>
+              <a:t>6/6/2023</a:t>
             </a:fld>
             <a:endParaRPr lang="en-AU"/>
           </a:p>
@@ -667,7 +673,7 @@
           <a:p>
             <a:fld id="{563D15DA-2CD3-5845-931C-11EBD52AFC9B}" type="datetimeFigureOut">
               <a:rPr lang="en-AU" smtClean="0"/>
-              <a:t>5/6/2023</a:t>
+              <a:t>6/6/2023</a:t>
             </a:fld>
             <a:endParaRPr lang="en-AU"/>
           </a:p>
@@ -867,7 +873,7 @@
           <a:p>
             <a:fld id="{563D15DA-2CD3-5845-931C-11EBD52AFC9B}" type="datetimeFigureOut">
               <a:rPr lang="en-AU" smtClean="0"/>
-              <a:t>5/6/2023</a:t>
+              <a:t>6/6/2023</a:t>
             </a:fld>
             <a:endParaRPr lang="en-AU"/>
           </a:p>
@@ -1143,7 +1149,7 @@
           <a:p>
             <a:fld id="{563D15DA-2CD3-5845-931C-11EBD52AFC9B}" type="datetimeFigureOut">
               <a:rPr lang="en-AU" smtClean="0"/>
-              <a:t>5/6/2023</a:t>
+              <a:t>6/6/2023</a:t>
             </a:fld>
             <a:endParaRPr lang="en-AU"/>
           </a:p>
@@ -1411,7 +1417,7 @@
           <a:p>
             <a:fld id="{563D15DA-2CD3-5845-931C-11EBD52AFC9B}" type="datetimeFigureOut">
               <a:rPr lang="en-AU" smtClean="0"/>
-              <a:t>5/6/2023</a:t>
+              <a:t>6/6/2023</a:t>
             </a:fld>
             <a:endParaRPr lang="en-AU"/>
           </a:p>
@@ -1826,7 +1832,7 @@
           <a:p>
             <a:fld id="{563D15DA-2CD3-5845-931C-11EBD52AFC9B}" type="datetimeFigureOut">
               <a:rPr lang="en-AU" smtClean="0"/>
-              <a:t>5/6/2023</a:t>
+              <a:t>6/6/2023</a:t>
             </a:fld>
             <a:endParaRPr lang="en-AU"/>
           </a:p>
@@ -1968,7 +1974,7 @@
           <a:p>
             <a:fld id="{563D15DA-2CD3-5845-931C-11EBD52AFC9B}" type="datetimeFigureOut">
               <a:rPr lang="en-AU" smtClean="0"/>
-              <a:t>5/6/2023</a:t>
+              <a:t>6/6/2023</a:t>
             </a:fld>
             <a:endParaRPr lang="en-AU"/>
           </a:p>
@@ -2081,7 +2087,7 @@
           <a:p>
             <a:fld id="{563D15DA-2CD3-5845-931C-11EBD52AFC9B}" type="datetimeFigureOut">
               <a:rPr lang="en-AU" smtClean="0"/>
-              <a:t>5/6/2023</a:t>
+              <a:t>6/6/2023</a:t>
             </a:fld>
             <a:endParaRPr lang="en-AU"/>
           </a:p>
@@ -2394,7 +2400,7 @@
           <a:p>
             <a:fld id="{563D15DA-2CD3-5845-931C-11EBD52AFC9B}" type="datetimeFigureOut">
               <a:rPr lang="en-AU" smtClean="0"/>
-              <a:t>5/6/2023</a:t>
+              <a:t>6/6/2023</a:t>
             </a:fld>
             <a:endParaRPr lang="en-AU"/>
           </a:p>
@@ -2683,7 +2689,7 @@
           <a:p>
             <a:fld id="{563D15DA-2CD3-5845-931C-11EBD52AFC9B}" type="datetimeFigureOut">
               <a:rPr lang="en-AU" smtClean="0"/>
-              <a:t>5/6/2023</a:t>
+              <a:t>6/6/2023</a:t>
             </a:fld>
             <a:endParaRPr lang="en-AU"/>
           </a:p>
@@ -2926,7 +2932,7 @@
           <a:p>
             <a:fld id="{563D15DA-2CD3-5845-931C-11EBD52AFC9B}" type="datetimeFigureOut">
               <a:rPr lang="en-AU" smtClean="0"/>
-              <a:t>5/6/2023</a:t>
+              <a:t>6/6/2023</a:t>
             </a:fld>
             <a:endParaRPr lang="en-AU"/>
           </a:p>
@@ -3327,6 +3333,1061 @@
 </file>
 
 <file path=ppt/slides/slide1.xml><?xml version="1.0" encoding="utf-8"?>
+<p:sld xmlns:a="http://schemas.openxmlformats.org/drawingml/2006/main" xmlns:r="http://schemas.openxmlformats.org/officeDocument/2006/relationships" xmlns:p="http://schemas.openxmlformats.org/presentationml/2006/main">
+  <p:cSld>
+    <p:spTree>
+      <p:nvGrpSpPr>
+        <p:cNvPr id="1" name=""/>
+        <p:cNvGrpSpPr/>
+        <p:nvPr/>
+      </p:nvGrpSpPr>
+      <p:grpSpPr>
+        <a:xfrm>
+          <a:off x="0" y="0"/>
+          <a:ext cx="0" cy="0"/>
+          <a:chOff x="0" y="0"/>
+          <a:chExt cx="0" cy="0"/>
+        </a:xfrm>
+      </p:grpSpPr>
+      <p:grpSp>
+        <p:nvGrpSpPr>
+          <p:cNvPr id="24" name="Group 23">
+            <a:extLst>
+              <a:ext uri="{FF2B5EF4-FFF2-40B4-BE49-F238E27FC236}">
+                <a16:creationId xmlns:a16="http://schemas.microsoft.com/office/drawing/2014/main" id="{081C19CB-5687-98F6-9F7E-421460F00781}"/>
+              </a:ext>
+            </a:extLst>
+          </p:cNvPr>
+          <p:cNvGrpSpPr/>
+          <p:nvPr/>
+        </p:nvGrpSpPr>
+        <p:grpSpPr>
+          <a:xfrm>
+            <a:off x="2739420" y="1352947"/>
+            <a:ext cx="6945146" cy="1731602"/>
+            <a:chOff x="2739420" y="1352947"/>
+            <a:chExt cx="6945146" cy="1731602"/>
+          </a:xfrm>
+        </p:grpSpPr>
+        <p:sp>
+          <p:nvSpPr>
+            <p:cNvPr id="5" name="Process 4">
+              <a:extLst>
+                <a:ext uri="{FF2B5EF4-FFF2-40B4-BE49-F238E27FC236}">
+                  <a16:creationId xmlns:a16="http://schemas.microsoft.com/office/drawing/2014/main" id="{947B2E6A-595C-3C39-516F-9D14796F7A92}"/>
+                </a:ext>
+              </a:extLst>
+            </p:cNvPr>
+            <p:cNvSpPr/>
+            <p:nvPr/>
+          </p:nvSpPr>
+          <p:spPr>
+            <a:xfrm>
+              <a:off x="2739420" y="2417742"/>
+              <a:ext cx="1368152" cy="612648"/>
+            </a:xfrm>
+            <a:prstGeom prst="flowChartProcess">
+              <a:avLst/>
+            </a:prstGeom>
+            <a:solidFill>
+              <a:srgbClr val="5B9CD5"/>
+            </a:solidFill>
+            <a:ln>
+              <a:solidFill>
+                <a:srgbClr val="5B9CD5"/>
+              </a:solidFill>
+            </a:ln>
+          </p:spPr>
+          <p:style>
+            <a:lnRef idx="2">
+              <a:schemeClr val="accent2">
+                <a:shade val="50000"/>
+              </a:schemeClr>
+            </a:lnRef>
+            <a:fillRef idx="1">
+              <a:schemeClr val="accent2"/>
+            </a:fillRef>
+            <a:effectRef idx="0">
+              <a:schemeClr val="accent2"/>
+            </a:effectRef>
+            <a:fontRef idx="minor">
+              <a:schemeClr val="lt1"/>
+            </a:fontRef>
+          </p:style>
+          <p:txBody>
+            <a:bodyPr rtlCol="0" anchor="ctr"/>
+            <a:lstStyle/>
+            <a:p>
+              <a:pPr algn="ctr"/>
+              <a:r>
+                <a:rPr lang="en-AU" sz="2800" b="1" dirty="0">
+                  <a:solidFill>
+                    <a:schemeClr val="bg1"/>
+                  </a:solidFill>
+                </a:rPr>
+                <a:t>S</a:t>
+              </a:r>
+              <a:r>
+                <a:rPr lang="en-AU" dirty="0">
+                  <a:solidFill>
+                    <a:schemeClr val="bg1"/>
+                  </a:solidFill>
+                </a:rPr>
+                <a:t>usceptible</a:t>
+              </a:r>
+            </a:p>
+          </p:txBody>
+        </p:sp>
+        <p:sp>
+          <p:nvSpPr>
+            <p:cNvPr id="6" name="Process 5">
+              <a:extLst>
+                <a:ext uri="{FF2B5EF4-FFF2-40B4-BE49-F238E27FC236}">
+                  <a16:creationId xmlns:a16="http://schemas.microsoft.com/office/drawing/2014/main" id="{51CE2785-B21A-7E0A-E272-72CE2A958F72}"/>
+                </a:ext>
+              </a:extLst>
+            </p:cNvPr>
+            <p:cNvSpPr/>
+            <p:nvPr/>
+          </p:nvSpPr>
+          <p:spPr>
+            <a:xfrm>
+              <a:off x="5580110" y="2417742"/>
+              <a:ext cx="1368152" cy="612648"/>
+            </a:xfrm>
+            <a:prstGeom prst="flowChartProcess">
+              <a:avLst/>
+            </a:prstGeom>
+            <a:solidFill>
+              <a:srgbClr val="5B9CD5"/>
+            </a:solidFill>
+            <a:ln>
+              <a:solidFill>
+                <a:srgbClr val="5B9CD5"/>
+              </a:solidFill>
+            </a:ln>
+          </p:spPr>
+          <p:style>
+            <a:lnRef idx="2">
+              <a:schemeClr val="accent6">
+                <a:shade val="50000"/>
+              </a:schemeClr>
+            </a:lnRef>
+            <a:fillRef idx="1">
+              <a:schemeClr val="accent6"/>
+            </a:fillRef>
+            <a:effectRef idx="0">
+              <a:schemeClr val="accent6"/>
+            </a:effectRef>
+            <a:fontRef idx="minor">
+              <a:schemeClr val="lt1"/>
+            </a:fontRef>
+          </p:style>
+          <p:txBody>
+            <a:bodyPr rtlCol="0" anchor="ctr"/>
+            <a:lstStyle/>
+            <a:p>
+              <a:pPr algn="ctr"/>
+              <a:r>
+                <a:rPr lang="en-AU" sz="2800" b="1" dirty="0">
+                  <a:solidFill>
+                    <a:schemeClr val="bg1"/>
+                  </a:solidFill>
+                </a:rPr>
+                <a:t>I</a:t>
+              </a:r>
+              <a:r>
+                <a:rPr lang="en-AU" dirty="0">
+                  <a:solidFill>
+                    <a:schemeClr val="bg1"/>
+                  </a:solidFill>
+                </a:rPr>
+                <a:t>nfectious</a:t>
+              </a:r>
+            </a:p>
+          </p:txBody>
+        </p:sp>
+        <p:sp>
+          <p:nvSpPr>
+            <p:cNvPr id="7" name="Process 6">
+              <a:extLst>
+                <a:ext uri="{FF2B5EF4-FFF2-40B4-BE49-F238E27FC236}">
+                  <a16:creationId xmlns:a16="http://schemas.microsoft.com/office/drawing/2014/main" id="{7E4135C7-DEA0-AEA0-61FB-EA606CEFBF30}"/>
+                </a:ext>
+              </a:extLst>
+            </p:cNvPr>
+            <p:cNvSpPr/>
+            <p:nvPr/>
+          </p:nvSpPr>
+          <p:spPr>
+            <a:xfrm>
+              <a:off x="8316414" y="2417742"/>
+              <a:ext cx="1368152" cy="612648"/>
+            </a:xfrm>
+            <a:prstGeom prst="flowChartProcess">
+              <a:avLst/>
+            </a:prstGeom>
+            <a:solidFill>
+              <a:srgbClr val="5B9CD5"/>
+            </a:solidFill>
+            <a:ln>
+              <a:solidFill>
+                <a:srgbClr val="5B9CD5"/>
+              </a:solidFill>
+            </a:ln>
+          </p:spPr>
+          <p:style>
+            <a:lnRef idx="2">
+              <a:schemeClr val="accent5">
+                <a:shade val="50000"/>
+              </a:schemeClr>
+            </a:lnRef>
+            <a:fillRef idx="1">
+              <a:schemeClr val="accent5"/>
+            </a:fillRef>
+            <a:effectRef idx="0">
+              <a:schemeClr val="accent5"/>
+            </a:effectRef>
+            <a:fontRef idx="minor">
+              <a:schemeClr val="lt1"/>
+            </a:fontRef>
+          </p:style>
+          <p:txBody>
+            <a:bodyPr rtlCol="0" anchor="ctr"/>
+            <a:lstStyle/>
+            <a:p>
+              <a:pPr algn="ctr"/>
+              <a:r>
+                <a:rPr lang="en-AU" sz="2800" b="1" dirty="0">
+                  <a:solidFill>
+                    <a:schemeClr val="bg1"/>
+                  </a:solidFill>
+                </a:rPr>
+                <a:t>R</a:t>
+              </a:r>
+              <a:r>
+                <a:rPr lang="en-AU" dirty="0">
+                  <a:solidFill>
+                    <a:schemeClr val="bg1"/>
+                  </a:solidFill>
+                </a:rPr>
+                <a:t>ecovered</a:t>
+              </a:r>
+            </a:p>
+          </p:txBody>
+        </p:sp>
+        <p:cxnSp>
+          <p:nvCxnSpPr>
+            <p:cNvPr id="8" name="Straight Arrow Connector 7">
+              <a:extLst>
+                <a:ext uri="{FF2B5EF4-FFF2-40B4-BE49-F238E27FC236}">
+                  <a16:creationId xmlns:a16="http://schemas.microsoft.com/office/drawing/2014/main" id="{4F57E84E-6D8F-4346-FCDD-D7521E59C211}"/>
+                </a:ext>
+              </a:extLst>
+            </p:cNvPr>
+            <p:cNvCxnSpPr>
+              <a:stCxn id="5" idx="3"/>
+              <a:endCxn id="6" idx="1"/>
+            </p:cNvCxnSpPr>
+            <p:nvPr/>
+          </p:nvCxnSpPr>
+          <p:spPr>
+            <a:xfrm>
+              <a:off x="4107572" y="2724066"/>
+              <a:ext cx="1472538" cy="0"/>
+            </a:xfrm>
+            <a:prstGeom prst="straightConnector1">
+              <a:avLst/>
+            </a:prstGeom>
+            <a:ln w="25400">
+              <a:solidFill>
+                <a:srgbClr val="FF0000"/>
+              </a:solidFill>
+              <a:tailEnd type="triangle"/>
+            </a:ln>
+          </p:spPr>
+          <p:style>
+            <a:lnRef idx="1">
+              <a:schemeClr val="accent1"/>
+            </a:lnRef>
+            <a:fillRef idx="0">
+              <a:schemeClr val="accent1"/>
+            </a:fillRef>
+            <a:effectRef idx="0">
+              <a:schemeClr val="accent1"/>
+            </a:effectRef>
+            <a:fontRef idx="minor">
+              <a:schemeClr val="tx1"/>
+            </a:fontRef>
+          </p:style>
+        </p:cxnSp>
+        <p:cxnSp>
+          <p:nvCxnSpPr>
+            <p:cNvPr id="9" name="Straight Arrow Connector 8">
+              <a:extLst>
+                <a:ext uri="{FF2B5EF4-FFF2-40B4-BE49-F238E27FC236}">
+                  <a16:creationId xmlns:a16="http://schemas.microsoft.com/office/drawing/2014/main" id="{9946168D-4822-3FF2-924B-392182EC0CE3}"/>
+                </a:ext>
+              </a:extLst>
+            </p:cNvPr>
+            <p:cNvCxnSpPr>
+              <a:cxnSpLocks/>
+              <a:endCxn id="7" idx="1"/>
+            </p:cNvCxnSpPr>
+            <p:nvPr/>
+          </p:nvCxnSpPr>
+          <p:spPr>
+            <a:xfrm>
+              <a:off x="6948262" y="2724066"/>
+              <a:ext cx="1368152" cy="0"/>
+            </a:xfrm>
+            <a:prstGeom prst="straightConnector1">
+              <a:avLst/>
+            </a:prstGeom>
+            <a:ln w="25400">
+              <a:solidFill>
+                <a:srgbClr val="FF0000"/>
+              </a:solidFill>
+              <a:tailEnd type="triangle"/>
+            </a:ln>
+          </p:spPr>
+          <p:style>
+            <a:lnRef idx="1">
+              <a:schemeClr val="accent1"/>
+            </a:lnRef>
+            <a:fillRef idx="0">
+              <a:schemeClr val="accent1"/>
+            </a:fillRef>
+            <a:effectRef idx="0">
+              <a:schemeClr val="accent1"/>
+            </a:effectRef>
+            <a:fontRef idx="minor">
+              <a:schemeClr val="tx1"/>
+            </a:fontRef>
+          </p:style>
+        </p:cxnSp>
+        <mc:AlternateContent xmlns:mc="http://schemas.openxmlformats.org/markup-compatibility/2006" xmlns:a14="http://schemas.microsoft.com/office/drawing/2010/main">
+          <mc:Choice Requires="a14">
+            <p:sp>
+              <p:nvSpPr>
+                <p:cNvPr id="11" name="Rectangle 10">
+                  <a:extLst>
+                    <a:ext uri="{FF2B5EF4-FFF2-40B4-BE49-F238E27FC236}">
+                      <a16:creationId xmlns:a16="http://schemas.microsoft.com/office/drawing/2014/main" id="{2E6DEAD4-4BB3-0FF3-42F8-AB863412C45E}"/>
+                    </a:ext>
+                  </a:extLst>
+                </p:cNvPr>
+                <p:cNvSpPr/>
+                <p:nvPr/>
+              </p:nvSpPr>
+              <p:spPr>
+                <a:xfrm>
+                  <a:off x="4536234" y="2715217"/>
+                  <a:ext cx="526876" cy="369332"/>
+                </a:xfrm>
+                <a:prstGeom prst="rect">
+                  <a:avLst/>
+                </a:prstGeom>
+              </p:spPr>
+              <p:txBody>
+                <a:bodyPr wrap="none">
+                  <a:spAutoFit/>
+                </a:bodyPr>
+                <a:lstStyle/>
+                <a:p>
+                  <a14:m>
+                    <m:oMath xmlns:m="http://schemas.openxmlformats.org/officeDocument/2006/math">
+                      <m:r>
+                        <a:rPr lang="en-US" b="0" i="1" smtClean="0">
+                          <a:solidFill>
+                            <a:schemeClr val="tx1"/>
+                          </a:solidFill>
+                          <a:latin typeface="Cambria Math" panose="02040503050406030204" pitchFamily="18" charset="0"/>
+                        </a:rPr>
+                        <m:t>𝜆</m:t>
+                      </m:r>
+                    </m:oMath>
+                  </a14:m>
+                  <a:r>
+                    <a:rPr lang="en-AU" dirty="0">
+                      <a:solidFill>
+                        <a:schemeClr val="tx1"/>
+                      </a:solidFill>
+                    </a:rPr>
+                    <a:t>(t)</a:t>
+                  </a:r>
+                </a:p>
+              </p:txBody>
+            </p:sp>
+          </mc:Choice>
+          <mc:Fallback xmlns="">
+            <p:sp>
+              <p:nvSpPr>
+                <p:cNvPr id="11" name="Rectangle 10">
+                  <a:extLst>
+                    <a:ext uri="{FF2B5EF4-FFF2-40B4-BE49-F238E27FC236}">
+                      <a16:creationId xmlns:a16="http://schemas.microsoft.com/office/drawing/2014/main" id="{2E6DEAD4-4BB3-0FF3-42F8-AB863412C45E}"/>
+                    </a:ext>
+                  </a:extLst>
+                </p:cNvPr>
+                <p:cNvSpPr>
+                  <a:spLocks noRot="1" noChangeAspect="1" noMove="1" noResize="1" noEditPoints="1" noAdjustHandles="1" noChangeArrowheads="1" noChangeShapeType="1" noTextEdit="1"/>
+                </p:cNvSpPr>
+                <p:nvPr/>
+              </p:nvSpPr>
+              <p:spPr>
+                <a:xfrm>
+                  <a:off x="4536234" y="2715217"/>
+                  <a:ext cx="526876" cy="369332"/>
+                </a:xfrm>
+                <a:prstGeom prst="rect">
+                  <a:avLst/>
+                </a:prstGeom>
+                <a:blipFill>
+                  <a:blip r:embed="rId2"/>
+                  <a:stretch>
+                    <a:fillRect t="-6667" r="-9524" b="-26667"/>
+                  </a:stretch>
+                </a:blipFill>
+              </p:spPr>
+              <p:txBody>
+                <a:bodyPr/>
+                <a:lstStyle/>
+                <a:p>
+                  <a:r>
+                    <a:rPr lang="en-AU">
+                      <a:noFill/>
+                    </a:rPr>
+                    <a:t> </a:t>
+                  </a:r>
+                </a:p>
+              </p:txBody>
+            </p:sp>
+          </mc:Fallback>
+        </mc:AlternateContent>
+        <mc:AlternateContent xmlns:mc="http://schemas.openxmlformats.org/markup-compatibility/2006" xmlns:a14="http://schemas.microsoft.com/office/drawing/2010/main">
+          <mc:Choice Requires="a14">
+            <p:sp>
+              <p:nvSpPr>
+                <p:cNvPr id="12" name="Rectangle 11">
+                  <a:extLst>
+                    <a:ext uri="{FF2B5EF4-FFF2-40B4-BE49-F238E27FC236}">
+                      <a16:creationId xmlns:a16="http://schemas.microsoft.com/office/drawing/2014/main" id="{6DA4D5D5-DF6E-4FE8-0A11-F26EFAD2BB68}"/>
+                    </a:ext>
+                  </a:extLst>
+                </p:cNvPr>
+                <p:cNvSpPr/>
+                <p:nvPr/>
+              </p:nvSpPr>
+              <p:spPr>
+                <a:xfrm>
+                  <a:off x="7449531" y="2661058"/>
+                  <a:ext cx="365613" cy="369332"/>
+                </a:xfrm>
+                <a:prstGeom prst="rect">
+                  <a:avLst/>
+                </a:prstGeom>
+              </p:spPr>
+              <p:txBody>
+                <a:bodyPr wrap="none">
+                  <a:spAutoFit/>
+                </a:bodyPr>
+                <a:lstStyle/>
+                <a:p>
+                  <a:pPr/>
+                  <a14:m>
+                    <m:oMathPara xmlns:m="http://schemas.openxmlformats.org/officeDocument/2006/math">
+                      <m:oMathParaPr>
+                        <m:jc m:val="centerGroup"/>
+                      </m:oMathParaPr>
+                      <m:oMath xmlns:m="http://schemas.openxmlformats.org/officeDocument/2006/math">
+                        <m:r>
+                          <a:rPr lang="en-US" i="1" smtClean="0">
+                            <a:solidFill>
+                              <a:schemeClr val="tx1"/>
+                            </a:solidFill>
+                            <a:latin typeface="Cambria Math" panose="02040503050406030204" pitchFamily="18" charset="0"/>
+                          </a:rPr>
+                          <m:t>𝛾</m:t>
+                        </m:r>
+                      </m:oMath>
+                    </m:oMathPara>
+                  </a14:m>
+                  <a:endParaRPr lang="en-AU" dirty="0">
+                    <a:solidFill>
+                      <a:schemeClr val="tx1"/>
+                    </a:solidFill>
+                  </a:endParaRPr>
+                </a:p>
+              </p:txBody>
+            </p:sp>
+          </mc:Choice>
+          <mc:Fallback xmlns="">
+            <p:sp>
+              <p:nvSpPr>
+                <p:cNvPr id="12" name="Rectangle 11">
+                  <a:extLst>
+                    <a:ext uri="{FF2B5EF4-FFF2-40B4-BE49-F238E27FC236}">
+                      <a16:creationId xmlns:a16="http://schemas.microsoft.com/office/drawing/2014/main" id="{6DA4D5D5-DF6E-4FE8-0A11-F26EFAD2BB68}"/>
+                    </a:ext>
+                  </a:extLst>
+                </p:cNvPr>
+                <p:cNvSpPr>
+                  <a:spLocks noRot="1" noChangeAspect="1" noMove="1" noResize="1" noEditPoints="1" noAdjustHandles="1" noChangeArrowheads="1" noChangeShapeType="1" noTextEdit="1"/>
+                </p:cNvSpPr>
+                <p:nvPr/>
+              </p:nvSpPr>
+              <p:spPr>
+                <a:xfrm>
+                  <a:off x="7449531" y="2661058"/>
+                  <a:ext cx="365613" cy="369332"/>
+                </a:xfrm>
+                <a:prstGeom prst="rect">
+                  <a:avLst/>
+                </a:prstGeom>
+                <a:blipFill>
+                  <a:blip r:embed="rId3"/>
+                  <a:stretch>
+                    <a:fillRect b="-6667"/>
+                  </a:stretch>
+                </a:blipFill>
+              </p:spPr>
+              <p:txBody>
+                <a:bodyPr/>
+                <a:lstStyle/>
+                <a:p>
+                  <a:r>
+                    <a:rPr lang="en-AU">
+                      <a:noFill/>
+                    </a:rPr>
+                    <a:t> </a:t>
+                  </a:r>
+                </a:p>
+              </p:txBody>
+            </p:sp>
+          </mc:Fallback>
+        </mc:AlternateContent>
+        <mc:AlternateContent xmlns:mc="http://schemas.openxmlformats.org/markup-compatibility/2006" xmlns:a14="http://schemas.microsoft.com/office/drawing/2010/main">
+          <mc:Choice Requires="a14">
+            <p:sp>
+              <p:nvSpPr>
+                <p:cNvPr id="14" name="Rectangle 13">
+                  <a:extLst>
+                    <a:ext uri="{FF2B5EF4-FFF2-40B4-BE49-F238E27FC236}">
+                      <a16:creationId xmlns:a16="http://schemas.microsoft.com/office/drawing/2014/main" id="{87197E84-8087-8FDC-6EB4-F9084F39850A}"/>
+                    </a:ext>
+                  </a:extLst>
+                </p:cNvPr>
+                <p:cNvSpPr/>
+                <p:nvPr/>
+              </p:nvSpPr>
+              <p:spPr>
+                <a:xfrm>
+                  <a:off x="4094268" y="2354734"/>
+                  <a:ext cx="1516762" cy="369332"/>
+                </a:xfrm>
+                <a:prstGeom prst="rect">
+                  <a:avLst/>
+                </a:prstGeom>
+              </p:spPr>
+              <p:txBody>
+                <a:bodyPr wrap="none">
+                  <a:spAutoFit/>
+                </a:bodyPr>
+                <a:lstStyle/>
+                <a:p>
+                  <a:pPr/>
+                  <a14:m>
+                    <m:oMathPara xmlns:m="http://schemas.openxmlformats.org/officeDocument/2006/math">
+                      <m:oMathParaPr>
+                        <m:jc m:val="centerGroup"/>
+                      </m:oMathParaPr>
+                      <m:oMath xmlns:m="http://schemas.openxmlformats.org/officeDocument/2006/math">
+                        <m:r>
+                          <m:rPr>
+                            <m:sty m:val="p"/>
+                          </m:rPr>
+                          <a:rPr lang="en-AU" b="0" i="0" smtClean="0">
+                            <a:solidFill>
+                              <a:schemeClr val="tx1"/>
+                            </a:solidFill>
+                            <a:latin typeface="Cambria Math" panose="02040503050406030204" pitchFamily="18" charset="0"/>
+                          </a:rPr>
+                          <m:t>transmission</m:t>
+                        </m:r>
+                      </m:oMath>
+                    </m:oMathPara>
+                  </a14:m>
+                  <a:endParaRPr lang="en-AU" dirty="0">
+                    <a:solidFill>
+                      <a:schemeClr val="tx1"/>
+                    </a:solidFill>
+                  </a:endParaRPr>
+                </a:p>
+              </p:txBody>
+            </p:sp>
+          </mc:Choice>
+          <mc:Fallback xmlns="">
+            <p:sp>
+              <p:nvSpPr>
+                <p:cNvPr id="14" name="Rectangle 13">
+                  <a:extLst>
+                    <a:ext uri="{FF2B5EF4-FFF2-40B4-BE49-F238E27FC236}">
+                      <a16:creationId xmlns:a16="http://schemas.microsoft.com/office/drawing/2014/main" id="{87197E84-8087-8FDC-6EB4-F9084F39850A}"/>
+                    </a:ext>
+                  </a:extLst>
+                </p:cNvPr>
+                <p:cNvSpPr>
+                  <a:spLocks noRot="1" noChangeAspect="1" noMove="1" noResize="1" noEditPoints="1" noAdjustHandles="1" noChangeArrowheads="1" noChangeShapeType="1" noTextEdit="1"/>
+                </p:cNvSpPr>
+                <p:nvPr/>
+              </p:nvSpPr>
+              <p:spPr>
+                <a:xfrm>
+                  <a:off x="4094268" y="2354734"/>
+                  <a:ext cx="1516762" cy="369332"/>
+                </a:xfrm>
+                <a:prstGeom prst="rect">
+                  <a:avLst/>
+                </a:prstGeom>
+                <a:blipFill>
+                  <a:blip r:embed="rId4"/>
+                  <a:stretch>
+                    <a:fillRect/>
+                  </a:stretch>
+                </a:blipFill>
+              </p:spPr>
+              <p:txBody>
+                <a:bodyPr/>
+                <a:lstStyle/>
+                <a:p>
+                  <a:r>
+                    <a:rPr lang="en-AU">
+                      <a:noFill/>
+                    </a:rPr>
+                    <a:t> </a:t>
+                  </a:r>
+                </a:p>
+              </p:txBody>
+            </p:sp>
+          </mc:Fallback>
+        </mc:AlternateContent>
+        <mc:AlternateContent xmlns:mc="http://schemas.openxmlformats.org/markup-compatibility/2006" xmlns:a14="http://schemas.microsoft.com/office/drawing/2010/main">
+          <mc:Choice Requires="a14">
+            <p:sp>
+              <p:nvSpPr>
+                <p:cNvPr id="15" name="Rectangle 14">
+                  <a:extLst>
+                    <a:ext uri="{FF2B5EF4-FFF2-40B4-BE49-F238E27FC236}">
+                      <a16:creationId xmlns:a16="http://schemas.microsoft.com/office/drawing/2014/main" id="{068F5AAC-1948-D42B-5590-104E55F7D23E}"/>
+                    </a:ext>
+                  </a:extLst>
+                </p:cNvPr>
+                <p:cNvSpPr/>
+                <p:nvPr/>
+              </p:nvSpPr>
+              <p:spPr>
+                <a:xfrm>
+                  <a:off x="7083149" y="2323231"/>
+                  <a:ext cx="1098378" cy="369332"/>
+                </a:xfrm>
+                <a:prstGeom prst="rect">
+                  <a:avLst/>
+                </a:prstGeom>
+              </p:spPr>
+              <p:txBody>
+                <a:bodyPr wrap="none">
+                  <a:spAutoFit/>
+                </a:bodyPr>
+                <a:lstStyle/>
+                <a:p>
+                  <a:pPr/>
+                  <a14:m>
+                    <m:oMathPara xmlns:m="http://schemas.openxmlformats.org/officeDocument/2006/math">
+                      <m:oMathParaPr>
+                        <m:jc m:val="centerGroup"/>
+                      </m:oMathParaPr>
+                      <m:oMath xmlns:m="http://schemas.openxmlformats.org/officeDocument/2006/math">
+                        <m:r>
+                          <m:rPr>
+                            <m:sty m:val="p"/>
+                          </m:rPr>
+                          <a:rPr lang="en-AU" b="0" i="0" smtClean="0">
+                            <a:solidFill>
+                              <a:schemeClr val="tx1"/>
+                            </a:solidFill>
+                            <a:latin typeface="Cambria Math" panose="02040503050406030204" pitchFamily="18" charset="0"/>
+                          </a:rPr>
+                          <m:t>recovery</m:t>
+                        </m:r>
+                      </m:oMath>
+                    </m:oMathPara>
+                  </a14:m>
+                  <a:endParaRPr lang="en-AU" dirty="0">
+                    <a:solidFill>
+                      <a:schemeClr val="tx1"/>
+                    </a:solidFill>
+                  </a:endParaRPr>
+                </a:p>
+              </p:txBody>
+            </p:sp>
+          </mc:Choice>
+          <mc:Fallback xmlns="">
+            <p:sp>
+              <p:nvSpPr>
+                <p:cNvPr id="15" name="Rectangle 14">
+                  <a:extLst>
+                    <a:ext uri="{FF2B5EF4-FFF2-40B4-BE49-F238E27FC236}">
+                      <a16:creationId xmlns:a16="http://schemas.microsoft.com/office/drawing/2014/main" id="{068F5AAC-1948-D42B-5590-104E55F7D23E}"/>
+                    </a:ext>
+                  </a:extLst>
+                </p:cNvPr>
+                <p:cNvSpPr>
+                  <a:spLocks noRot="1" noChangeAspect="1" noMove="1" noResize="1" noEditPoints="1" noAdjustHandles="1" noChangeArrowheads="1" noChangeShapeType="1" noTextEdit="1"/>
+                </p:cNvSpPr>
+                <p:nvPr/>
+              </p:nvSpPr>
+              <p:spPr>
+                <a:xfrm>
+                  <a:off x="7083149" y="2323231"/>
+                  <a:ext cx="1098378" cy="369332"/>
+                </a:xfrm>
+                <a:prstGeom prst="rect">
+                  <a:avLst/>
+                </a:prstGeom>
+                <a:blipFill>
+                  <a:blip r:embed="rId5"/>
+                  <a:stretch>
+                    <a:fillRect b="-6452"/>
+                  </a:stretch>
+                </a:blipFill>
+              </p:spPr>
+              <p:txBody>
+                <a:bodyPr/>
+                <a:lstStyle/>
+                <a:p>
+                  <a:r>
+                    <a:rPr lang="en-AU">
+                      <a:noFill/>
+                    </a:rPr>
+                    <a:t> </a:t>
+                  </a:r>
+                </a:p>
+              </p:txBody>
+            </p:sp>
+          </mc:Fallback>
+        </mc:AlternateContent>
+        <p:cxnSp>
+          <p:nvCxnSpPr>
+            <p:cNvPr id="19" name="Curved Connector 18">
+              <a:extLst>
+                <a:ext uri="{FF2B5EF4-FFF2-40B4-BE49-F238E27FC236}">
+                  <a16:creationId xmlns:a16="http://schemas.microsoft.com/office/drawing/2014/main" id="{3A5437F4-575F-40F0-14A1-19321A5A6241}"/>
+                </a:ext>
+              </a:extLst>
+            </p:cNvPr>
+            <p:cNvCxnSpPr>
+              <a:stCxn id="7" idx="0"/>
+              <a:endCxn id="5" idx="0"/>
+            </p:cNvCxnSpPr>
+            <p:nvPr/>
+          </p:nvCxnSpPr>
+          <p:spPr>
+            <a:xfrm rot="16200000" flipV="1">
+              <a:off x="6211993" y="-370755"/>
+              <a:ext cx="12700" cy="5576994"/>
+            </a:xfrm>
+            <a:prstGeom prst="curvedConnector3">
+              <a:avLst>
+                <a:gd name="adj1" fmla="val 5752945"/>
+              </a:avLst>
+            </a:prstGeom>
+            <a:ln w="25400">
+              <a:solidFill>
+                <a:srgbClr val="FF0000"/>
+              </a:solidFill>
+              <a:tailEnd type="triangle"/>
+            </a:ln>
+          </p:spPr>
+          <p:style>
+            <a:lnRef idx="1">
+              <a:schemeClr val="accent1"/>
+            </a:lnRef>
+            <a:fillRef idx="0">
+              <a:schemeClr val="accent1"/>
+            </a:fillRef>
+            <a:effectRef idx="0">
+              <a:schemeClr val="accent1"/>
+            </a:effectRef>
+            <a:fontRef idx="minor">
+              <a:schemeClr val="tx1"/>
+            </a:fontRef>
+          </p:style>
+        </p:cxnSp>
+        <mc:AlternateContent xmlns:mc="http://schemas.openxmlformats.org/markup-compatibility/2006" xmlns:a14="http://schemas.microsoft.com/office/drawing/2010/main">
+          <mc:Choice Requires="a14">
+            <p:sp>
+              <p:nvSpPr>
+                <p:cNvPr id="21" name="Rectangle 20">
+                  <a:extLst>
+                    <a:ext uri="{FF2B5EF4-FFF2-40B4-BE49-F238E27FC236}">
+                      <a16:creationId xmlns:a16="http://schemas.microsoft.com/office/drawing/2014/main" id="{5C10C0C7-27D5-8F76-CB68-D832970591E7}"/>
+                    </a:ext>
+                  </a:extLst>
+                </p:cNvPr>
+                <p:cNvSpPr/>
+                <p:nvPr/>
+              </p:nvSpPr>
+              <p:spPr>
+                <a:xfrm>
+                  <a:off x="5337619" y="1352947"/>
+                  <a:ext cx="1880643" cy="369332"/>
+                </a:xfrm>
+                <a:prstGeom prst="rect">
+                  <a:avLst/>
+                </a:prstGeom>
+              </p:spPr>
+              <p:txBody>
+                <a:bodyPr wrap="none">
+                  <a:spAutoFit/>
+                </a:bodyPr>
+                <a:lstStyle/>
+                <a:p>
+                  <a:pPr/>
+                  <a14:m>
+                    <m:oMathPara xmlns:m="http://schemas.openxmlformats.org/officeDocument/2006/math">
+                      <m:oMathParaPr>
+                        <m:jc m:val="centerGroup"/>
+                      </m:oMathParaPr>
+                      <m:oMath xmlns:m="http://schemas.openxmlformats.org/officeDocument/2006/math">
+                        <m:r>
+                          <m:rPr>
+                            <m:sty m:val="p"/>
+                          </m:rPr>
+                          <a:rPr lang="en-AU" b="0" i="0" smtClean="0">
+                            <a:solidFill>
+                              <a:schemeClr val="tx1"/>
+                            </a:solidFill>
+                            <a:latin typeface="Cambria Math" panose="02040503050406030204" pitchFamily="18" charset="0"/>
+                          </a:rPr>
+                          <m:t>loss</m:t>
+                        </m:r>
+                        <m:r>
+                          <a:rPr lang="en-AU" b="0" i="0" smtClean="0">
+                            <a:solidFill>
+                              <a:schemeClr val="tx1"/>
+                            </a:solidFill>
+                            <a:latin typeface="Cambria Math" panose="02040503050406030204" pitchFamily="18" charset="0"/>
+                          </a:rPr>
+                          <m:t> </m:t>
+                        </m:r>
+                        <m:r>
+                          <m:rPr>
+                            <m:sty m:val="p"/>
+                          </m:rPr>
+                          <a:rPr lang="en-AU" b="0" i="0" smtClean="0">
+                            <a:solidFill>
+                              <a:schemeClr val="tx1"/>
+                            </a:solidFill>
+                            <a:latin typeface="Cambria Math" panose="02040503050406030204" pitchFamily="18" charset="0"/>
+                          </a:rPr>
+                          <m:t>of</m:t>
+                        </m:r>
+                        <m:r>
+                          <a:rPr lang="en-AU" b="0" i="0" smtClean="0">
+                            <a:solidFill>
+                              <a:schemeClr val="tx1"/>
+                            </a:solidFill>
+                            <a:latin typeface="Cambria Math" panose="02040503050406030204" pitchFamily="18" charset="0"/>
+                          </a:rPr>
+                          <m:t> </m:t>
+                        </m:r>
+                        <m:r>
+                          <m:rPr>
+                            <m:sty m:val="p"/>
+                          </m:rPr>
+                          <a:rPr lang="en-AU" b="0" i="0" smtClean="0">
+                            <a:solidFill>
+                              <a:schemeClr val="tx1"/>
+                            </a:solidFill>
+                            <a:latin typeface="Cambria Math" panose="02040503050406030204" pitchFamily="18" charset="0"/>
+                          </a:rPr>
+                          <m:t>immunity</m:t>
+                        </m:r>
+                      </m:oMath>
+                    </m:oMathPara>
+                  </a14:m>
+                  <a:endParaRPr lang="en-AU" dirty="0">
+                    <a:solidFill>
+                      <a:schemeClr val="tx1"/>
+                    </a:solidFill>
+                  </a:endParaRPr>
+                </a:p>
+              </p:txBody>
+            </p:sp>
+          </mc:Choice>
+          <mc:Fallback xmlns="">
+            <p:sp>
+              <p:nvSpPr>
+                <p:cNvPr id="21" name="Rectangle 20">
+                  <a:extLst>
+                    <a:ext uri="{FF2B5EF4-FFF2-40B4-BE49-F238E27FC236}">
+                      <a16:creationId xmlns:a16="http://schemas.microsoft.com/office/drawing/2014/main" id="{5C10C0C7-27D5-8F76-CB68-D832970591E7}"/>
+                    </a:ext>
+                  </a:extLst>
+                </p:cNvPr>
+                <p:cNvSpPr>
+                  <a:spLocks noRot="1" noChangeAspect="1" noMove="1" noResize="1" noEditPoints="1" noAdjustHandles="1" noChangeArrowheads="1" noChangeShapeType="1" noTextEdit="1"/>
+                </p:cNvSpPr>
+                <p:nvPr/>
+              </p:nvSpPr>
+              <p:spPr>
+                <a:xfrm>
+                  <a:off x="5337619" y="1352947"/>
+                  <a:ext cx="1880643" cy="369332"/>
+                </a:xfrm>
+                <a:prstGeom prst="rect">
+                  <a:avLst/>
+                </a:prstGeom>
+                <a:blipFill>
+                  <a:blip r:embed="rId6"/>
+                  <a:stretch>
+                    <a:fillRect b="-16667"/>
+                  </a:stretch>
+                </a:blipFill>
+              </p:spPr>
+              <p:txBody>
+                <a:bodyPr/>
+                <a:lstStyle/>
+                <a:p>
+                  <a:r>
+                    <a:rPr lang="en-AU">
+                      <a:noFill/>
+                    </a:rPr>
+                    <a:t> </a:t>
+                  </a:r>
+                </a:p>
+              </p:txBody>
+            </p:sp>
+          </mc:Fallback>
+        </mc:AlternateContent>
+        <mc:AlternateContent xmlns:mc="http://schemas.openxmlformats.org/markup-compatibility/2006" xmlns:a14="http://schemas.microsoft.com/office/drawing/2010/main">
+          <mc:Choice Requires="a14">
+            <p:sp>
+              <p:nvSpPr>
+                <p:cNvPr id="23" name="Rectangle 22">
+                  <a:extLst>
+                    <a:ext uri="{FF2B5EF4-FFF2-40B4-BE49-F238E27FC236}">
+                      <a16:creationId xmlns:a16="http://schemas.microsoft.com/office/drawing/2014/main" id="{5A2FB2B7-50F6-482B-AF4E-EF429DE6EA0C}"/>
+                    </a:ext>
+                  </a:extLst>
+                </p:cNvPr>
+                <p:cNvSpPr/>
+                <p:nvPr/>
+              </p:nvSpPr>
+              <p:spPr>
+                <a:xfrm>
+                  <a:off x="6075991" y="1643793"/>
+                  <a:ext cx="409343" cy="369332"/>
+                </a:xfrm>
+                <a:prstGeom prst="rect">
+                  <a:avLst/>
+                </a:prstGeom>
+              </p:spPr>
+              <p:txBody>
+                <a:bodyPr wrap="none">
+                  <a:spAutoFit/>
+                </a:bodyPr>
+                <a:lstStyle/>
+                <a:p>
+                  <a:pPr/>
+                  <a14:m>
+                    <m:oMathPara xmlns:m="http://schemas.openxmlformats.org/officeDocument/2006/math">
+                      <m:oMathParaPr>
+                        <m:jc m:val="centerGroup"/>
+                      </m:oMathParaPr>
+                      <m:oMath xmlns:m="http://schemas.openxmlformats.org/officeDocument/2006/math">
+                        <m:r>
+                          <a:rPr lang="en-AU" b="0" i="1" smtClean="0">
+                            <a:solidFill>
+                              <a:schemeClr val="tx1"/>
+                            </a:solidFill>
+                            <a:latin typeface="Cambria Math" panose="02040503050406030204" pitchFamily="18" charset="0"/>
+                          </a:rPr>
+                          <m:t>𝜔</m:t>
+                        </m:r>
+                      </m:oMath>
+                    </m:oMathPara>
+                  </a14:m>
+                  <a:endParaRPr lang="en-AU" dirty="0">
+                    <a:solidFill>
+                      <a:schemeClr val="tx1"/>
+                    </a:solidFill>
+                  </a:endParaRPr>
+                </a:p>
+              </p:txBody>
+            </p:sp>
+          </mc:Choice>
+          <mc:Fallback xmlns="">
+            <p:sp>
+              <p:nvSpPr>
+                <p:cNvPr id="23" name="Rectangle 22">
+                  <a:extLst>
+                    <a:ext uri="{FF2B5EF4-FFF2-40B4-BE49-F238E27FC236}">
+                      <a16:creationId xmlns:a16="http://schemas.microsoft.com/office/drawing/2014/main" id="{5A2FB2B7-50F6-482B-AF4E-EF429DE6EA0C}"/>
+                    </a:ext>
+                  </a:extLst>
+                </p:cNvPr>
+                <p:cNvSpPr>
+                  <a:spLocks noRot="1" noChangeAspect="1" noMove="1" noResize="1" noEditPoints="1" noAdjustHandles="1" noChangeArrowheads="1" noChangeShapeType="1" noTextEdit="1"/>
+                </p:cNvSpPr>
+                <p:nvPr/>
+              </p:nvSpPr>
+              <p:spPr>
+                <a:xfrm>
+                  <a:off x="6075991" y="1643793"/>
+                  <a:ext cx="409343" cy="369332"/>
+                </a:xfrm>
+                <a:prstGeom prst="rect">
+                  <a:avLst/>
+                </a:prstGeom>
+                <a:blipFill>
+                  <a:blip r:embed="rId7"/>
+                  <a:stretch>
+                    <a:fillRect/>
+                  </a:stretch>
+                </a:blipFill>
+              </p:spPr>
+              <p:txBody>
+                <a:bodyPr/>
+                <a:lstStyle/>
+                <a:p>
+                  <a:r>
+                    <a:rPr lang="en-AU">
+                      <a:noFill/>
+                    </a:rPr>
+                    <a:t> </a:t>
+                  </a:r>
+                </a:p>
+              </p:txBody>
+            </p:sp>
+          </mc:Fallback>
+        </mc:AlternateContent>
+      </p:grpSp>
+    </p:spTree>
+    <p:extLst>
+      <p:ext uri="{BB962C8B-B14F-4D97-AF65-F5344CB8AC3E}">
+        <p14:creationId xmlns:p14="http://schemas.microsoft.com/office/powerpoint/2010/main" val="3434456261"/>
+      </p:ext>
+    </p:extLst>
+  </p:cSld>
+  <p:clrMapOvr>
+    <a:masterClrMapping/>
+  </p:clrMapOvr>
+</p:sld>
+</file>
+
+<file path=ppt/slides/slide2.xml><?xml version="1.0" encoding="utf-8"?>
 <p:sld xmlns:a="http://schemas.openxmlformats.org/drawingml/2006/main" xmlns:r="http://schemas.openxmlformats.org/officeDocument/2006/relationships" xmlns:p="http://schemas.openxmlformats.org/presentationml/2006/main">
   <p:cSld>
     <p:spTree>
@@ -3890,6 +4951,7 @@
                 </a:bodyPr>
                 <a:lstStyle/>
                 <a:p>
+                  <a:pPr/>
                   <a14:m>
                     <m:oMathPara xmlns:m="http://schemas.openxmlformats.org/officeDocument/2006/math">
                       <m:oMathParaPr>
@@ -3994,6 +5056,7 @@
                 </a:bodyPr>
                 <a:lstStyle/>
                 <a:p>
+                  <a:pPr/>
                   <a14:m>
                     <m:oMathPara xmlns:m="http://schemas.openxmlformats.org/officeDocument/2006/math">
                       <m:oMathParaPr>
@@ -4145,6 +5208,7 @@
                 </a:bodyPr>
                 <a:lstStyle/>
                 <a:p>
+                  <a:pPr/>
                   <a14:m>
                     <m:oMathPara xmlns:m="http://schemas.openxmlformats.org/officeDocument/2006/math">
                       <m:oMathParaPr>
@@ -4398,7 +5462,7 @@
     </p:spTree>
     <p:extLst>
       <p:ext uri="{BB962C8B-B14F-4D97-AF65-F5344CB8AC3E}">
-        <p14:creationId xmlns:p14="http://schemas.microsoft.com/office/powerpoint/2010/main" val="3434456261"/>
+        <p14:creationId xmlns:p14="http://schemas.microsoft.com/office/powerpoint/2010/main" val="3832583247"/>
       </p:ext>
     </p:extLst>
   </p:cSld>
@@ -4408,7 +5472,7 @@
 </p:sld>
 </file>
 
-<file path=ppt/slides/slide2.xml><?xml version="1.0" encoding="utf-8"?>
+<file path=ppt/slides/slide3.xml><?xml version="1.0" encoding="utf-8"?>
 <p:sld xmlns:a="http://schemas.openxmlformats.org/drawingml/2006/main" xmlns:r="http://schemas.openxmlformats.org/officeDocument/2006/relationships" xmlns:p="http://schemas.openxmlformats.org/presentationml/2006/main">
   <p:cSld>
     <p:spTree>

</xml_diff>